<commit_message>
Renamed ipynb files to match section numbers
</commit_message>
<xml_diff>
--- a/01_Intro/01_Homework.pptx
+++ b/01_Intro/01_Homework.pptx
@@ -1324,7 +1324,7 @@
           <a:p>
             <a:fld id="{708145C7-F93C-CF48-9E42-BCE64EB95F09}" type="datetimeFigureOut">
               <a:rPr lang="en-US" smtClean="0"/>
-              <a:t>8/20/18</a:t>
+              <a:t>9/25/18</a:t>
             </a:fld>
             <a:endParaRPr lang="en-US"/>
           </a:p>
@@ -1562,7 +1562,7 @@
           <a:p>
             <a:fld id="{708145C7-F93C-CF48-9E42-BCE64EB95F09}" type="datetimeFigureOut">
               <a:rPr lang="en-US" smtClean="0"/>
-              <a:t>8/20/18</a:t>
+              <a:t>9/25/18</a:t>
             </a:fld>
             <a:endParaRPr lang="en-US"/>
           </a:p>
@@ -1742,7 +1742,7 @@
           <a:p>
             <a:fld id="{708145C7-F93C-CF48-9E42-BCE64EB95F09}" type="datetimeFigureOut">
               <a:rPr lang="en-US" smtClean="0"/>
-              <a:t>8/20/18</a:t>
+              <a:t>9/25/18</a:t>
             </a:fld>
             <a:endParaRPr lang="en-US"/>
           </a:p>
@@ -1912,7 +1912,7 @@
           <a:p>
             <a:fld id="{708145C7-F93C-CF48-9E42-BCE64EB95F09}" type="datetimeFigureOut">
               <a:rPr lang="en-US" smtClean="0"/>
-              <a:t>8/20/18</a:t>
+              <a:t>9/25/18</a:t>
             </a:fld>
             <a:endParaRPr lang="en-US"/>
           </a:p>
@@ -2188,7 +2188,7 @@
           <a:p>
             <a:fld id="{708145C7-F93C-CF48-9E42-BCE64EB95F09}" type="datetimeFigureOut">
               <a:rPr lang="en-US" smtClean="0"/>
-              <a:t>8/20/18</a:t>
+              <a:t>9/25/18</a:t>
             </a:fld>
             <a:endParaRPr lang="en-US"/>
           </a:p>
@@ -3389,7 +3389,7 @@
           <a:p>
             <a:fld id="{708145C7-F93C-CF48-9E42-BCE64EB95F09}" type="datetimeFigureOut">
               <a:rPr lang="en-US" smtClean="0"/>
-              <a:t>8/20/18</a:t>
+              <a:t>9/25/18</a:t>
             </a:fld>
             <a:endParaRPr lang="en-US"/>
           </a:p>
@@ -3779,7 +3779,7 @@
           <a:p>
             <a:fld id="{708145C7-F93C-CF48-9E42-BCE64EB95F09}" type="datetimeFigureOut">
               <a:rPr lang="en-US" smtClean="0"/>
-              <a:t>8/20/18</a:t>
+              <a:t>9/25/18</a:t>
             </a:fld>
             <a:endParaRPr lang="en-US"/>
           </a:p>
@@ -3902,7 +3902,7 @@
           <a:p>
             <a:fld id="{708145C7-F93C-CF48-9E42-BCE64EB95F09}" type="datetimeFigureOut">
               <a:rPr lang="en-US" smtClean="0"/>
-              <a:t>8/20/18</a:t>
+              <a:t>9/25/18</a:t>
             </a:fld>
             <a:endParaRPr lang="en-US"/>
           </a:p>
@@ -3997,7 +3997,7 @@
           <a:p>
             <a:fld id="{708145C7-F93C-CF48-9E42-BCE64EB95F09}" type="datetimeFigureOut">
               <a:rPr lang="en-US" smtClean="0"/>
-              <a:t>8/20/18</a:t>
+              <a:t>9/25/18</a:t>
             </a:fld>
             <a:endParaRPr lang="en-US"/>
           </a:p>
@@ -4760,7 +4760,7 @@
           <a:p>
             <a:fld id="{708145C7-F93C-CF48-9E42-BCE64EB95F09}" type="datetimeFigureOut">
               <a:rPr lang="en-US" smtClean="0"/>
-              <a:t>8/20/18</a:t>
+              <a:t>9/25/18</a:t>
             </a:fld>
             <a:endParaRPr lang="en-US"/>
           </a:p>
@@ -5600,7 +5600,7 @@
           <a:p>
             <a:fld id="{708145C7-F93C-CF48-9E42-BCE64EB95F09}" type="datetimeFigureOut">
               <a:rPr lang="en-US" smtClean="0"/>
-              <a:t>8/20/18</a:t>
+              <a:t>9/25/18</a:t>
             </a:fld>
             <a:endParaRPr lang="en-US"/>
           </a:p>
@@ -5827,7 +5827,7 @@
           <a:p>
             <a:fld id="{708145C7-F93C-CF48-9E42-BCE64EB95F09}" type="datetimeFigureOut">
               <a:rPr lang="en-US" smtClean="0"/>
-              <a:t>8/20/18</a:t>
+              <a:t>9/25/18</a:t>
             </a:fld>
             <a:endParaRPr lang="en-US"/>
           </a:p>
@@ -7049,7 +7049,19 @@
               <a:rPr lang="en-US" dirty="0">
                 <a:cs typeface="Courier New" panose="02070309020205020404" pitchFamily="49" charset="0"/>
               </a:rPr>
-              <a:t>Complete 01_Homework.ipynb using the following references</a:t>
+              <a:t>Complete 01</a:t>
+            </a:r>
+            <a:r>
+              <a:rPr lang="en-US">
+                <a:cs typeface="Courier New" panose="02070309020205020404" pitchFamily="49" charset="0"/>
+              </a:rPr>
+              <a:t>_Homework_1.</a:t>
+            </a:r>
+            <a:r>
+              <a:rPr lang="en-US" dirty="0">
+                <a:cs typeface="Courier New" panose="02070309020205020404" pitchFamily="49" charset="0"/>
+              </a:rPr>
+              <a:t>ipynb using the following references</a:t>
             </a:r>
           </a:p>
           <a:p>

</xml_diff>